<commit_message>
Updating figures and notebook
</commit_message>
<xml_diff>
--- a/Images/SI1.pptx
+++ b/Images/SI1.pptx
@@ -107,6 +107,11 @@
       </a:defRPr>
     </a:lvl9pPr>
   </p:defaultTextStyle>
+  <p:extLst>
+    <p:ext uri="{EFAFB233-063F-42B5-8137-9DF3F51BA10A}">
+      <p15:sldGuideLst xmlns:p15="http://schemas.microsoft.com/office/powerpoint/2012/main"/>
+    </p:ext>
+  </p:extLst>
 </p:presentation>
 </file>
 
@@ -192,7 +197,7 @@
           <a:p>
             <a:fld id="{0C45F89B-D0D3-4AC5-836F-869636F86470}" type="datetimeFigureOut">
               <a:rPr lang="en-US" smtClean="0"/>
-              <a:t>7/15/2021</a:t>
+              <a:t>8/12/2021</a:t>
             </a:fld>
             <a:endParaRPr lang="en-US"/>
           </a:p>
@@ -674,7 +679,7 @@
           <a:p>
             <a:fld id="{1516511B-B61A-47A9-97DC-35FBB5E54714}" type="datetimeFigureOut">
               <a:rPr lang="en-US" smtClean="0"/>
-              <a:t>7/15/2021</a:t>
+              <a:t>8/12/2021</a:t>
             </a:fld>
             <a:endParaRPr lang="en-US"/>
           </a:p>
@@ -844,7 +849,7 @@
           <a:p>
             <a:fld id="{1516511B-B61A-47A9-97DC-35FBB5E54714}" type="datetimeFigureOut">
               <a:rPr lang="en-US" smtClean="0"/>
-              <a:t>7/15/2021</a:t>
+              <a:t>8/12/2021</a:t>
             </a:fld>
             <a:endParaRPr lang="en-US"/>
           </a:p>
@@ -1024,7 +1029,7 @@
           <a:p>
             <a:fld id="{1516511B-B61A-47A9-97DC-35FBB5E54714}" type="datetimeFigureOut">
               <a:rPr lang="en-US" smtClean="0"/>
-              <a:t>7/15/2021</a:t>
+              <a:t>8/12/2021</a:t>
             </a:fld>
             <a:endParaRPr lang="en-US"/>
           </a:p>
@@ -1194,7 +1199,7 @@
           <a:p>
             <a:fld id="{1516511B-B61A-47A9-97DC-35FBB5E54714}" type="datetimeFigureOut">
               <a:rPr lang="en-US" smtClean="0"/>
-              <a:t>7/15/2021</a:t>
+              <a:t>8/12/2021</a:t>
             </a:fld>
             <a:endParaRPr lang="en-US"/>
           </a:p>
@@ -1438,7 +1443,7 @@
           <a:p>
             <a:fld id="{1516511B-B61A-47A9-97DC-35FBB5E54714}" type="datetimeFigureOut">
               <a:rPr lang="en-US" smtClean="0"/>
-              <a:t>7/15/2021</a:t>
+              <a:t>8/12/2021</a:t>
             </a:fld>
             <a:endParaRPr lang="en-US"/>
           </a:p>
@@ -1670,7 +1675,7 @@
           <a:p>
             <a:fld id="{1516511B-B61A-47A9-97DC-35FBB5E54714}" type="datetimeFigureOut">
               <a:rPr lang="en-US" smtClean="0"/>
-              <a:t>7/15/2021</a:t>
+              <a:t>8/12/2021</a:t>
             </a:fld>
             <a:endParaRPr lang="en-US"/>
           </a:p>
@@ -2037,7 +2042,7 @@
           <a:p>
             <a:fld id="{1516511B-B61A-47A9-97DC-35FBB5E54714}" type="datetimeFigureOut">
               <a:rPr lang="en-US" smtClean="0"/>
-              <a:t>7/15/2021</a:t>
+              <a:t>8/12/2021</a:t>
             </a:fld>
             <a:endParaRPr lang="en-US"/>
           </a:p>
@@ -2155,7 +2160,7 @@
           <a:p>
             <a:fld id="{1516511B-B61A-47A9-97DC-35FBB5E54714}" type="datetimeFigureOut">
               <a:rPr lang="en-US" smtClean="0"/>
-              <a:t>7/15/2021</a:t>
+              <a:t>8/12/2021</a:t>
             </a:fld>
             <a:endParaRPr lang="en-US"/>
           </a:p>
@@ -2250,7 +2255,7 @@
           <a:p>
             <a:fld id="{1516511B-B61A-47A9-97DC-35FBB5E54714}" type="datetimeFigureOut">
               <a:rPr lang="en-US" smtClean="0"/>
-              <a:t>7/15/2021</a:t>
+              <a:t>8/12/2021</a:t>
             </a:fld>
             <a:endParaRPr lang="en-US"/>
           </a:p>
@@ -2527,7 +2532,7 @@
           <a:p>
             <a:fld id="{1516511B-B61A-47A9-97DC-35FBB5E54714}" type="datetimeFigureOut">
               <a:rPr lang="en-US" smtClean="0"/>
-              <a:t>7/15/2021</a:t>
+              <a:t>8/12/2021</a:t>
             </a:fld>
             <a:endParaRPr lang="en-US"/>
           </a:p>
@@ -2784,7 +2789,7 @@
           <a:p>
             <a:fld id="{1516511B-B61A-47A9-97DC-35FBB5E54714}" type="datetimeFigureOut">
               <a:rPr lang="en-US" smtClean="0"/>
-              <a:t>7/15/2021</a:t>
+              <a:t>8/12/2021</a:t>
             </a:fld>
             <a:endParaRPr lang="en-US"/>
           </a:p>
@@ -2997,7 +3002,7 @@
           <a:p>
             <a:fld id="{1516511B-B61A-47A9-97DC-35FBB5E54714}" type="datetimeFigureOut">
               <a:rPr lang="en-US" smtClean="0"/>
-              <a:t>7/15/2021</a:t>
+              <a:t>8/12/2021</a:t>
             </a:fld>
             <a:endParaRPr lang="en-US"/>
           </a:p>
@@ -3625,82 +3630,6 @@
           <a:p>
             <a:pPr algn="ctr"/>
             <a:endParaRPr lang="en-US" sz="2880"/>
-          </a:p>
-        </p:txBody>
-      </p:sp>
-      <p:sp>
-        <p:nvSpPr>
-          <p:cNvPr id="14" name="TextBox 13">
-            <a:extLst>
-              <a:ext uri="{FF2B5EF4-FFF2-40B4-BE49-F238E27FC236}">
-                <a16:creationId xmlns:a16="http://schemas.microsoft.com/office/drawing/2014/main" id="{682DCFE2-89E4-4B3D-84C9-D24DBACDD2A0}"/>
-              </a:ext>
-            </a:extLst>
-          </p:cNvPr>
-          <p:cNvSpPr txBox="1"/>
-          <p:nvPr/>
-        </p:nvSpPr>
-        <p:spPr>
-          <a:xfrm>
-            <a:off x="7212942" y="1579741"/>
-            <a:ext cx="1463040" cy="240066"/>
-          </a:xfrm>
-          <a:prstGeom prst="rect">
-            <a:avLst/>
-          </a:prstGeom>
-          <a:noFill/>
-        </p:spPr>
-        <p:txBody>
-          <a:bodyPr wrap="square" rtlCol="0">
-            <a:spAutoFit/>
-          </a:bodyPr>
-          <a:lstStyle/>
-          <a:p>
-            <a:r>
-              <a:rPr lang="en-US" sz="960" dirty="0">
-                <a:latin typeface="Times New Roman" panose="02020603050405020304" pitchFamily="18" charset="0"/>
-                <a:cs typeface="Times New Roman" panose="02020603050405020304" pitchFamily="18" charset="0"/>
-              </a:rPr>
-              <a:t>DrugBank</a:t>
-            </a:r>
-          </a:p>
-        </p:txBody>
-      </p:sp>
-      <p:sp>
-        <p:nvSpPr>
-          <p:cNvPr id="15" name="TextBox 14">
-            <a:extLst>
-              <a:ext uri="{FF2B5EF4-FFF2-40B4-BE49-F238E27FC236}">
-                <a16:creationId xmlns:a16="http://schemas.microsoft.com/office/drawing/2014/main" id="{58D59CE3-4AB3-4D65-A910-56AE57F1DDE3}"/>
-              </a:ext>
-            </a:extLst>
-          </p:cNvPr>
-          <p:cNvSpPr txBox="1"/>
-          <p:nvPr/>
-        </p:nvSpPr>
-        <p:spPr>
-          <a:xfrm>
-            <a:off x="7212942" y="1795456"/>
-            <a:ext cx="1463040" cy="240066"/>
-          </a:xfrm>
-          <a:prstGeom prst="rect">
-            <a:avLst/>
-          </a:prstGeom>
-          <a:noFill/>
-        </p:spPr>
-        <p:txBody>
-          <a:bodyPr wrap="square" rtlCol="0">
-            <a:spAutoFit/>
-          </a:bodyPr>
-          <a:lstStyle/>
-          <a:p>
-            <a:r>
-              <a:rPr lang="en-US" sz="960" dirty="0">
-                <a:latin typeface="Times New Roman" panose="02020603050405020304" pitchFamily="18" charset="0"/>
-                <a:cs typeface="Times New Roman" panose="02020603050405020304" pitchFamily="18" charset="0"/>
-              </a:rPr>
-              <a:t>NCFD</a:t>
-            </a:r>
           </a:p>
         </p:txBody>
       </p:sp>

</xml_diff>

<commit_message>
Updating figures and Eigen Spokes
</commit_message>
<xml_diff>
--- a/Images/SI1.pptx
+++ b/Images/SI1.pptx
@@ -197,7 +197,7 @@
           <a:p>
             <a:fld id="{0C45F89B-D0D3-4AC5-836F-869636F86470}" type="datetimeFigureOut">
               <a:rPr lang="en-US" smtClean="0"/>
-              <a:t>8/12/2021</a:t>
+              <a:t>8/24/2021</a:t>
             </a:fld>
             <a:endParaRPr lang="en-US"/>
           </a:p>
@@ -679,7 +679,7 @@
           <a:p>
             <a:fld id="{1516511B-B61A-47A9-97DC-35FBB5E54714}" type="datetimeFigureOut">
               <a:rPr lang="en-US" smtClean="0"/>
-              <a:t>8/12/2021</a:t>
+              <a:t>8/24/2021</a:t>
             </a:fld>
             <a:endParaRPr lang="en-US"/>
           </a:p>
@@ -849,7 +849,7 @@
           <a:p>
             <a:fld id="{1516511B-B61A-47A9-97DC-35FBB5E54714}" type="datetimeFigureOut">
               <a:rPr lang="en-US" smtClean="0"/>
-              <a:t>8/12/2021</a:t>
+              <a:t>8/24/2021</a:t>
             </a:fld>
             <a:endParaRPr lang="en-US"/>
           </a:p>
@@ -1029,7 +1029,7 @@
           <a:p>
             <a:fld id="{1516511B-B61A-47A9-97DC-35FBB5E54714}" type="datetimeFigureOut">
               <a:rPr lang="en-US" smtClean="0"/>
-              <a:t>8/12/2021</a:t>
+              <a:t>8/24/2021</a:t>
             </a:fld>
             <a:endParaRPr lang="en-US"/>
           </a:p>
@@ -1199,7 +1199,7 @@
           <a:p>
             <a:fld id="{1516511B-B61A-47A9-97DC-35FBB5E54714}" type="datetimeFigureOut">
               <a:rPr lang="en-US" smtClean="0"/>
-              <a:t>8/12/2021</a:t>
+              <a:t>8/24/2021</a:t>
             </a:fld>
             <a:endParaRPr lang="en-US"/>
           </a:p>
@@ -1443,7 +1443,7 @@
           <a:p>
             <a:fld id="{1516511B-B61A-47A9-97DC-35FBB5E54714}" type="datetimeFigureOut">
               <a:rPr lang="en-US" smtClean="0"/>
-              <a:t>8/12/2021</a:t>
+              <a:t>8/24/2021</a:t>
             </a:fld>
             <a:endParaRPr lang="en-US"/>
           </a:p>
@@ -1675,7 +1675,7 @@
           <a:p>
             <a:fld id="{1516511B-B61A-47A9-97DC-35FBB5E54714}" type="datetimeFigureOut">
               <a:rPr lang="en-US" smtClean="0"/>
-              <a:t>8/12/2021</a:t>
+              <a:t>8/24/2021</a:t>
             </a:fld>
             <a:endParaRPr lang="en-US"/>
           </a:p>
@@ -2042,7 +2042,7 @@
           <a:p>
             <a:fld id="{1516511B-B61A-47A9-97DC-35FBB5E54714}" type="datetimeFigureOut">
               <a:rPr lang="en-US" smtClean="0"/>
-              <a:t>8/12/2021</a:t>
+              <a:t>8/24/2021</a:t>
             </a:fld>
             <a:endParaRPr lang="en-US"/>
           </a:p>
@@ -2160,7 +2160,7 @@
           <a:p>
             <a:fld id="{1516511B-B61A-47A9-97DC-35FBB5E54714}" type="datetimeFigureOut">
               <a:rPr lang="en-US" smtClean="0"/>
-              <a:t>8/12/2021</a:t>
+              <a:t>8/24/2021</a:t>
             </a:fld>
             <a:endParaRPr lang="en-US"/>
           </a:p>
@@ -2255,7 +2255,7 @@
           <a:p>
             <a:fld id="{1516511B-B61A-47A9-97DC-35FBB5E54714}" type="datetimeFigureOut">
               <a:rPr lang="en-US" smtClean="0"/>
-              <a:t>8/12/2021</a:t>
+              <a:t>8/24/2021</a:t>
             </a:fld>
             <a:endParaRPr lang="en-US"/>
           </a:p>
@@ -2532,7 +2532,7 @@
           <a:p>
             <a:fld id="{1516511B-B61A-47A9-97DC-35FBB5E54714}" type="datetimeFigureOut">
               <a:rPr lang="en-US" smtClean="0"/>
-              <a:t>8/12/2021</a:t>
+              <a:t>8/24/2021</a:t>
             </a:fld>
             <a:endParaRPr lang="en-US"/>
           </a:p>
@@ -2789,7 +2789,7 @@
           <a:p>
             <a:fld id="{1516511B-B61A-47A9-97DC-35FBB5E54714}" type="datetimeFigureOut">
               <a:rPr lang="en-US" smtClean="0"/>
-              <a:t>8/12/2021</a:t>
+              <a:t>8/24/2021</a:t>
             </a:fld>
             <a:endParaRPr lang="en-US"/>
           </a:p>
@@ -3002,7 +3002,7 @@
           <a:p>
             <a:fld id="{1516511B-B61A-47A9-97DC-35FBB5E54714}" type="datetimeFigureOut">
               <a:rPr lang="en-US" smtClean="0"/>
-              <a:t>8/12/2021</a:t>
+              <a:t>8/24/2021</a:t>
             </a:fld>
             <a:endParaRPr lang="en-US"/>
           </a:p>
@@ -3561,7 +3561,7 @@
         <p:spPr>
           <a:xfrm>
             <a:off x="-11132" y="-48459"/>
-            <a:ext cx="312906" cy="400110"/>
+            <a:ext cx="370614" cy="400110"/>
           </a:xfrm>
           <a:prstGeom prst="rect">
             <a:avLst/>
@@ -3579,7 +3579,7 @@
                 <a:latin typeface="Times New Roman" panose="02020603050405020304" pitchFamily="18" charset="0"/>
                 <a:cs typeface="Times New Roman" panose="02020603050405020304" pitchFamily="18" charset="0"/>
               </a:rPr>
-              <a:t>a</a:t>
+              <a:t>A</a:t>
             </a:r>
           </a:p>
         </p:txBody>
@@ -4297,7 +4297,7 @@
         <p:spPr>
           <a:xfrm>
             <a:off x="5373843" y="-52427"/>
-            <a:ext cx="327334" cy="400110"/>
+            <a:ext cx="356188" cy="400110"/>
           </a:xfrm>
           <a:prstGeom prst="rect">
             <a:avLst/>
@@ -4315,7 +4315,7 @@
                 <a:latin typeface="Times New Roman" panose="02020603050405020304" pitchFamily="18" charset="0"/>
                 <a:cs typeface="Times New Roman" panose="02020603050405020304" pitchFamily="18" charset="0"/>
               </a:rPr>
-              <a:t>b</a:t>
+              <a:t>B</a:t>
             </a:r>
           </a:p>
         </p:txBody>
@@ -4335,7 +4335,7 @@
         <p:spPr>
           <a:xfrm>
             <a:off x="5348445" y="4414116"/>
-            <a:ext cx="298480" cy="400110"/>
+            <a:ext cx="370614" cy="400110"/>
           </a:xfrm>
           <a:prstGeom prst="rect">
             <a:avLst/>
@@ -4349,12 +4349,16 @@
           <a:lstStyle/>
           <a:p>
             <a:r>
-              <a:rPr lang="en-US" sz="2000" b="1" dirty="0">
+              <a:rPr lang="en-US" sz="2000" b="1">
                 <a:latin typeface="Times New Roman" panose="02020603050405020304" pitchFamily="18" charset="0"/>
                 <a:cs typeface="Times New Roman" panose="02020603050405020304" pitchFamily="18" charset="0"/>
               </a:rPr>
-              <a:t>c</a:t>
-            </a:r>
+              <a:t>C</a:t>
+            </a:r>
+            <a:endParaRPr lang="en-US" sz="2000" b="1" dirty="0">
+              <a:latin typeface="Times New Roman" panose="02020603050405020304" pitchFamily="18" charset="0"/>
+              <a:cs typeface="Times New Roman" panose="02020603050405020304" pitchFamily="18" charset="0"/>
+            </a:endParaRPr>
           </a:p>
         </p:txBody>
       </p:sp>

</xml_diff>

<commit_message>
Adding experiments with engineered features
</commit_message>
<xml_diff>
--- a/Images/SI1.pptx
+++ b/Images/SI1.pptx
@@ -197,7 +197,7 @@
           <a:p>
             <a:fld id="{0C45F89B-D0D3-4AC5-836F-869636F86470}" type="datetimeFigureOut">
               <a:rPr lang="en-US" smtClean="0"/>
-              <a:t>8/24/2021</a:t>
+              <a:t>11/26/2021</a:t>
             </a:fld>
             <a:endParaRPr lang="en-US"/>
           </a:p>
@@ -679,7 +679,7 @@
           <a:p>
             <a:fld id="{1516511B-B61A-47A9-97DC-35FBB5E54714}" type="datetimeFigureOut">
               <a:rPr lang="en-US" smtClean="0"/>
-              <a:t>8/24/2021</a:t>
+              <a:t>11/26/2021</a:t>
             </a:fld>
             <a:endParaRPr lang="en-US"/>
           </a:p>
@@ -849,7 +849,7 @@
           <a:p>
             <a:fld id="{1516511B-B61A-47A9-97DC-35FBB5E54714}" type="datetimeFigureOut">
               <a:rPr lang="en-US" smtClean="0"/>
-              <a:t>8/24/2021</a:t>
+              <a:t>11/26/2021</a:t>
             </a:fld>
             <a:endParaRPr lang="en-US"/>
           </a:p>
@@ -1029,7 +1029,7 @@
           <a:p>
             <a:fld id="{1516511B-B61A-47A9-97DC-35FBB5E54714}" type="datetimeFigureOut">
               <a:rPr lang="en-US" smtClean="0"/>
-              <a:t>8/24/2021</a:t>
+              <a:t>11/26/2021</a:t>
             </a:fld>
             <a:endParaRPr lang="en-US"/>
           </a:p>
@@ -1199,7 +1199,7 @@
           <a:p>
             <a:fld id="{1516511B-B61A-47A9-97DC-35FBB5E54714}" type="datetimeFigureOut">
               <a:rPr lang="en-US" smtClean="0"/>
-              <a:t>8/24/2021</a:t>
+              <a:t>11/26/2021</a:t>
             </a:fld>
             <a:endParaRPr lang="en-US"/>
           </a:p>
@@ -1443,7 +1443,7 @@
           <a:p>
             <a:fld id="{1516511B-B61A-47A9-97DC-35FBB5E54714}" type="datetimeFigureOut">
               <a:rPr lang="en-US" smtClean="0"/>
-              <a:t>8/24/2021</a:t>
+              <a:t>11/26/2021</a:t>
             </a:fld>
             <a:endParaRPr lang="en-US"/>
           </a:p>
@@ -1675,7 +1675,7 @@
           <a:p>
             <a:fld id="{1516511B-B61A-47A9-97DC-35FBB5E54714}" type="datetimeFigureOut">
               <a:rPr lang="en-US" smtClean="0"/>
-              <a:t>8/24/2021</a:t>
+              <a:t>11/26/2021</a:t>
             </a:fld>
             <a:endParaRPr lang="en-US"/>
           </a:p>
@@ -2042,7 +2042,7 @@
           <a:p>
             <a:fld id="{1516511B-B61A-47A9-97DC-35FBB5E54714}" type="datetimeFigureOut">
               <a:rPr lang="en-US" smtClean="0"/>
-              <a:t>8/24/2021</a:t>
+              <a:t>11/26/2021</a:t>
             </a:fld>
             <a:endParaRPr lang="en-US"/>
           </a:p>
@@ -2160,7 +2160,7 @@
           <a:p>
             <a:fld id="{1516511B-B61A-47A9-97DC-35FBB5E54714}" type="datetimeFigureOut">
               <a:rPr lang="en-US" smtClean="0"/>
-              <a:t>8/24/2021</a:t>
+              <a:t>11/26/2021</a:t>
             </a:fld>
             <a:endParaRPr lang="en-US"/>
           </a:p>
@@ -2255,7 +2255,7 @@
           <a:p>
             <a:fld id="{1516511B-B61A-47A9-97DC-35FBB5E54714}" type="datetimeFigureOut">
               <a:rPr lang="en-US" smtClean="0"/>
-              <a:t>8/24/2021</a:t>
+              <a:t>11/26/2021</a:t>
             </a:fld>
             <a:endParaRPr lang="en-US"/>
           </a:p>
@@ -2532,7 +2532,7 @@
           <a:p>
             <a:fld id="{1516511B-B61A-47A9-97DC-35FBB5E54714}" type="datetimeFigureOut">
               <a:rPr lang="en-US" smtClean="0"/>
-              <a:t>8/24/2021</a:t>
+              <a:t>11/26/2021</a:t>
             </a:fld>
             <a:endParaRPr lang="en-US"/>
           </a:p>
@@ -2789,7 +2789,7 @@
           <a:p>
             <a:fld id="{1516511B-B61A-47A9-97DC-35FBB5E54714}" type="datetimeFigureOut">
               <a:rPr lang="en-US" smtClean="0"/>
-              <a:t>8/24/2021</a:t>
+              <a:t>11/26/2021</a:t>
             </a:fld>
             <a:endParaRPr lang="en-US"/>
           </a:p>
@@ -3002,7 +3002,7 @@
           <a:p>
             <a:fld id="{1516511B-B61A-47A9-97DC-35FBB5E54714}" type="datetimeFigureOut">
               <a:rPr lang="en-US" smtClean="0"/>
-              <a:t>8/24/2021</a:t>
+              <a:t>11/26/2021</a:t>
             </a:fld>
             <a:endParaRPr lang="en-US"/>
           </a:p>
@@ -3898,10 +3898,10 @@
         </p:nvGrpSpPr>
         <p:grpSpPr>
           <a:xfrm>
-            <a:off x="9136082" y="153115"/>
-            <a:ext cx="1245365" cy="553998"/>
-            <a:chOff x="9136082" y="153115"/>
-            <a:chExt cx="1245365" cy="553998"/>
+            <a:off x="9136082" y="171950"/>
+            <a:ext cx="1221860" cy="535163"/>
+            <a:chOff x="9136082" y="171950"/>
+            <a:chExt cx="1221860" cy="535163"/>
           </a:xfrm>
         </p:grpSpPr>
         <p:sp>
@@ -3918,7 +3918,7 @@
           </p:nvSpPr>
           <p:spPr>
             <a:xfrm>
-              <a:off x="9359888" y="153115"/>
+              <a:off x="9359479" y="171950"/>
               <a:ext cx="998463" cy="276999"/>
             </a:xfrm>
             <a:prstGeom prst="rect">
@@ -3958,7 +3958,7 @@
           </p:nvSpPr>
           <p:spPr>
             <a:xfrm>
-              <a:off x="9382984" y="430114"/>
+              <a:off x="9359479" y="430114"/>
               <a:ext cx="998463" cy="276999"/>
             </a:xfrm>
             <a:prstGeom prst="rect">

</xml_diff>